<commit_message>
Fixed Part 3 typos
</commit_message>
<xml_diff>
--- a/Presentation-Part3-Common-Design-Choices.pptx
+++ b/Presentation-Part3-Common-Design-Choices.pptx
@@ -871,7 +871,7 @@
           <a:noFill/>
           <a:extLst>
             <a:ext uri="{909E8E84-426E-40dd-AFC4-6F175D3DCCD1}">
-              <a14:hiddenFill xmlns="" xmlns:a14="http://schemas.microsoft.com/office/drawing/2010/main">
+              <a14:hiddenFill xmlns:a14="http://schemas.microsoft.com/office/drawing/2010/main" xmlns="">
                 <a:solidFill>
                   <a:srgbClr val="FFFFFF"/>
                 </a:solidFill>
@@ -931,7 +931,7 @@
             </a:ln>
             <a:extLst>
               <a:ext uri="{91240B29-F687-4f45-9708-019B960494DF}">
-                <a14:hiddenLine xmlns="" xmlns:a14="http://schemas.microsoft.com/office/drawing/2010/main" w="9525">
+                <a14:hiddenLine xmlns:a14="http://schemas.microsoft.com/office/drawing/2010/main" xmlns="" w="9525">
                   <a:solidFill>
                     <a:srgbClr val="000000"/>
                   </a:solidFill>
@@ -1021,7 +1021,7 @@
             </a:ln>
             <a:extLst>
               <a:ext uri="{91240B29-F687-4f45-9708-019B960494DF}">
-                <a14:hiddenLine xmlns="" xmlns:a14="http://schemas.microsoft.com/office/drawing/2010/main" w="9525">
+                <a14:hiddenLine xmlns:a14="http://schemas.microsoft.com/office/drawing/2010/main" xmlns="" w="9525">
                   <a:solidFill>
                     <a:srgbClr val="000000"/>
                   </a:solidFill>
@@ -1111,7 +1111,7 @@
             </a:ln>
             <a:extLst>
               <a:ext uri="{91240B29-F687-4f45-9708-019B960494DF}">
-                <a14:hiddenLine xmlns="" xmlns:a14="http://schemas.microsoft.com/office/drawing/2010/main" w="9525">
+                <a14:hiddenLine xmlns:a14="http://schemas.microsoft.com/office/drawing/2010/main" xmlns="" w="9525">
                   <a:solidFill>
                     <a:srgbClr val="000000"/>
                   </a:solidFill>
@@ -1145,7 +1145,7 @@
             </a:ln>
             <a:extLst>
               <a:ext uri="{91240B29-F687-4f45-9708-019B960494DF}">
-                <a14:hiddenLine xmlns="" xmlns:a14="http://schemas.microsoft.com/office/drawing/2010/main" w="9525">
+                <a14:hiddenLine xmlns:a14="http://schemas.microsoft.com/office/drawing/2010/main" xmlns="" w="9525">
                   <a:solidFill>
                     <a:srgbClr val="000000"/>
                   </a:solidFill>
@@ -1235,7 +1235,7 @@
             </a:ln>
             <a:extLst>
               <a:ext uri="{91240B29-F687-4f45-9708-019B960494DF}">
-                <a14:hiddenLine xmlns="" xmlns:a14="http://schemas.microsoft.com/office/drawing/2010/main" w="9525">
+                <a14:hiddenLine xmlns:a14="http://schemas.microsoft.com/office/drawing/2010/main" xmlns="" w="9525">
                   <a:solidFill>
                     <a:srgbClr val="000000"/>
                   </a:solidFill>
@@ -1297,7 +1297,7 @@
             </a:ln>
             <a:extLst>
               <a:ext uri="{91240B29-F687-4f45-9708-019B960494DF}">
-                <a14:hiddenLine xmlns="" xmlns:a14="http://schemas.microsoft.com/office/drawing/2010/main" w="9525">
+                <a14:hiddenLine xmlns:a14="http://schemas.microsoft.com/office/drawing/2010/main" xmlns="" w="9525">
                   <a:solidFill>
                     <a:srgbClr val="000000"/>
                   </a:solidFill>
@@ -1359,7 +1359,7 @@
             </a:ln>
             <a:extLst>
               <a:ext uri="{91240B29-F687-4f45-9708-019B960494DF}">
-                <a14:hiddenLine xmlns="" xmlns:a14="http://schemas.microsoft.com/office/drawing/2010/main" w="9525">
+                <a14:hiddenLine xmlns:a14="http://schemas.microsoft.com/office/drawing/2010/main" xmlns="" w="9525">
                   <a:solidFill>
                     <a:srgbClr val="000000"/>
                   </a:solidFill>
@@ -1449,7 +1449,7 @@
             </a:ln>
             <a:extLst>
               <a:ext uri="{91240B29-F687-4f45-9708-019B960494DF}">
-                <a14:hiddenLine xmlns="" xmlns:a14="http://schemas.microsoft.com/office/drawing/2010/main" w="9525">
+                <a14:hiddenLine xmlns:a14="http://schemas.microsoft.com/office/drawing/2010/main" xmlns="" w="9525">
                   <a:solidFill>
                     <a:srgbClr val="000000"/>
                   </a:solidFill>
@@ -1511,7 +1511,7 @@
             </a:ln>
             <a:extLst>
               <a:ext uri="{91240B29-F687-4f45-9708-019B960494DF}">
-                <a14:hiddenLine xmlns="" xmlns:a14="http://schemas.microsoft.com/office/drawing/2010/main" w="9525">
+                <a14:hiddenLine xmlns:a14="http://schemas.microsoft.com/office/drawing/2010/main" xmlns="" w="9525">
                   <a:solidFill>
                     <a:srgbClr val="000000"/>
                   </a:solidFill>
@@ -1573,7 +1573,7 @@
             </a:ln>
             <a:extLst>
               <a:ext uri="{91240B29-F687-4f45-9708-019B960494DF}">
-                <a14:hiddenLine xmlns="" xmlns:a14="http://schemas.microsoft.com/office/drawing/2010/main" w="9525">
+                <a14:hiddenLine xmlns:a14="http://schemas.microsoft.com/office/drawing/2010/main" xmlns="" w="9525">
                   <a:solidFill>
                     <a:srgbClr val="000000"/>
                   </a:solidFill>
@@ -1663,7 +1663,7 @@
             </a:ln>
             <a:extLst>
               <a:ext uri="{91240B29-F687-4f45-9708-019B960494DF}">
-                <a14:hiddenLine xmlns="" xmlns:a14="http://schemas.microsoft.com/office/drawing/2010/main" w="9525">
+                <a14:hiddenLine xmlns:a14="http://schemas.microsoft.com/office/drawing/2010/main" xmlns="" w="9525">
                   <a:solidFill>
                     <a:srgbClr val="000000"/>
                   </a:solidFill>
@@ -1753,7 +1753,7 @@
             </a:ln>
             <a:extLst>
               <a:ext uri="{91240B29-F687-4f45-9708-019B960494DF}">
-                <a14:hiddenLine xmlns="" xmlns:a14="http://schemas.microsoft.com/office/drawing/2010/main" w="9525">
+                <a14:hiddenLine xmlns:a14="http://schemas.microsoft.com/office/drawing/2010/main" xmlns="" w="9525">
                   <a:solidFill>
                     <a:srgbClr val="000000"/>
                   </a:solidFill>
@@ -1815,7 +1815,7 @@
             </a:ln>
             <a:extLst>
               <a:ext uri="{91240B29-F687-4f45-9708-019B960494DF}">
-                <a14:hiddenLine xmlns="" xmlns:a14="http://schemas.microsoft.com/office/drawing/2010/main" w="9525">
+                <a14:hiddenLine xmlns:a14="http://schemas.microsoft.com/office/drawing/2010/main" xmlns="" w="9525">
                   <a:solidFill>
                     <a:srgbClr val="000000"/>
                   </a:solidFill>
@@ -1925,7 +1925,7 @@
             </a:ln>
             <a:extLst>
               <a:ext uri="{91240B29-F687-4f45-9708-019B960494DF}">
-                <a14:hiddenLine xmlns="" xmlns:a14="http://schemas.microsoft.com/office/drawing/2010/main" w="9525">
+                <a14:hiddenLine xmlns:a14="http://schemas.microsoft.com/office/drawing/2010/main" xmlns="" w="9525">
                   <a:solidFill>
                     <a:srgbClr val="000000"/>
                   </a:solidFill>
@@ -1987,7 +1987,7 @@
             </a:ln>
             <a:extLst>
               <a:ext uri="{91240B29-F687-4f45-9708-019B960494DF}">
-                <a14:hiddenLine xmlns="" xmlns:a14="http://schemas.microsoft.com/office/drawing/2010/main" w="9525">
+                <a14:hiddenLine xmlns:a14="http://schemas.microsoft.com/office/drawing/2010/main" xmlns="" w="9525">
                   <a:solidFill>
                     <a:srgbClr val="000000"/>
                   </a:solidFill>
@@ -2077,7 +2077,7 @@
             </a:ln>
             <a:extLst>
               <a:ext uri="{91240B29-F687-4f45-9708-019B960494DF}">
-                <a14:hiddenLine xmlns="" xmlns:a14="http://schemas.microsoft.com/office/drawing/2010/main" w="9525">
+                <a14:hiddenLine xmlns:a14="http://schemas.microsoft.com/office/drawing/2010/main" xmlns="" w="9525">
                   <a:solidFill>
                     <a:srgbClr val="000000"/>
                   </a:solidFill>
@@ -2167,7 +2167,7 @@
             </a:ln>
             <a:extLst>
               <a:ext uri="{91240B29-F687-4f45-9708-019B960494DF}">
-                <a14:hiddenLine xmlns="" xmlns:a14="http://schemas.microsoft.com/office/drawing/2010/main" w="9525">
+                <a14:hiddenLine xmlns:a14="http://schemas.microsoft.com/office/drawing/2010/main" xmlns="" w="9525">
                   <a:solidFill>
                     <a:srgbClr val="000000"/>
                   </a:solidFill>
@@ -2229,7 +2229,7 @@
             </a:ln>
             <a:extLst>
               <a:ext uri="{91240B29-F687-4f45-9708-019B960494DF}">
-                <a14:hiddenLine xmlns="" xmlns:a14="http://schemas.microsoft.com/office/drawing/2010/main" w="9525">
+                <a14:hiddenLine xmlns:a14="http://schemas.microsoft.com/office/drawing/2010/main" xmlns="" w="9525">
                   <a:solidFill>
                     <a:srgbClr val="000000"/>
                   </a:solidFill>
@@ -2319,7 +2319,7 @@
             </a:ln>
             <a:extLst>
               <a:ext uri="{91240B29-F687-4f45-9708-019B960494DF}">
-                <a14:hiddenLine xmlns="" xmlns:a14="http://schemas.microsoft.com/office/drawing/2010/main" w="9525">
+                <a14:hiddenLine xmlns:a14="http://schemas.microsoft.com/office/drawing/2010/main" xmlns="" w="9525">
                   <a:solidFill>
                     <a:srgbClr val="000000"/>
                   </a:solidFill>
@@ -2409,7 +2409,7 @@
             </a:ln>
             <a:extLst>
               <a:ext uri="{91240B29-F687-4f45-9708-019B960494DF}">
-                <a14:hiddenLine xmlns="" xmlns:a14="http://schemas.microsoft.com/office/drawing/2010/main" w="9525">
+                <a14:hiddenLine xmlns:a14="http://schemas.microsoft.com/office/drawing/2010/main" xmlns="" w="9525">
                   <a:solidFill>
                     <a:srgbClr val="000000"/>
                   </a:solidFill>
@@ -2465,7 +2465,7 @@
             </a:ln>
             <a:extLst>
               <a:ext uri="{91240B29-F687-4f45-9708-019B960494DF}">
-                <a14:hiddenLine xmlns="" xmlns:a14="http://schemas.microsoft.com/office/drawing/2010/main" w="9525">
+                <a14:hiddenLine xmlns:a14="http://schemas.microsoft.com/office/drawing/2010/main" xmlns="" w="9525">
                   <a:solidFill>
                     <a:srgbClr val="000000"/>
                   </a:solidFill>
@@ -2555,7 +2555,7 @@
             </a:ln>
             <a:extLst>
               <a:ext uri="{91240B29-F687-4f45-9708-019B960494DF}">
-                <a14:hiddenLine xmlns="" xmlns:a14="http://schemas.microsoft.com/office/drawing/2010/main" w="9525">
+                <a14:hiddenLine xmlns:a14="http://schemas.microsoft.com/office/drawing/2010/main" xmlns="" w="9525">
                   <a:solidFill>
                     <a:srgbClr val="000000"/>
                   </a:solidFill>
@@ -2611,7 +2611,7 @@
             </a:ln>
             <a:extLst>
               <a:ext uri="{91240B29-F687-4f45-9708-019B960494DF}">
-                <a14:hiddenLine xmlns="" xmlns:a14="http://schemas.microsoft.com/office/drawing/2010/main" w="9525">
+                <a14:hiddenLine xmlns:a14="http://schemas.microsoft.com/office/drawing/2010/main" xmlns="" w="9525">
                   <a:solidFill>
                     <a:srgbClr val="000000"/>
                   </a:solidFill>
@@ -2701,7 +2701,7 @@
             </a:ln>
             <a:extLst>
               <a:ext uri="{91240B29-F687-4f45-9708-019B960494DF}">
-                <a14:hiddenLine xmlns="" xmlns:a14="http://schemas.microsoft.com/office/drawing/2010/main" w="9525">
+                <a14:hiddenLine xmlns:a14="http://schemas.microsoft.com/office/drawing/2010/main" xmlns="" w="9525">
                   <a:solidFill>
                     <a:srgbClr val="000000"/>
                   </a:solidFill>
@@ -2769,7 +2769,7 @@
             </a:ln>
             <a:extLst>
               <a:ext uri="{91240B29-F687-4f45-9708-019B960494DF}">
-                <a14:hiddenLine xmlns="" xmlns:a14="http://schemas.microsoft.com/office/drawing/2010/main" w="9525">
+                <a14:hiddenLine xmlns:a14="http://schemas.microsoft.com/office/drawing/2010/main" xmlns="" w="9525">
                   <a:solidFill>
                     <a:srgbClr val="000000"/>
                   </a:solidFill>
@@ -2859,7 +2859,7 @@
             </a:ln>
             <a:extLst>
               <a:ext uri="{91240B29-F687-4f45-9708-019B960494DF}">
-                <a14:hiddenLine xmlns="" xmlns:a14="http://schemas.microsoft.com/office/drawing/2010/main" w="9525">
+                <a14:hiddenLine xmlns:a14="http://schemas.microsoft.com/office/drawing/2010/main" xmlns="" w="9525">
                   <a:solidFill>
                     <a:srgbClr val="000000"/>
                   </a:solidFill>
@@ -2927,7 +2927,7 @@
             </a:ln>
             <a:extLst>
               <a:ext uri="{91240B29-F687-4f45-9708-019B960494DF}">
-                <a14:hiddenLine xmlns="" xmlns:a14="http://schemas.microsoft.com/office/drawing/2010/main" w="9525">
+                <a14:hiddenLine xmlns:a14="http://schemas.microsoft.com/office/drawing/2010/main" xmlns="" w="9525">
                   <a:solidFill>
                     <a:srgbClr val="000000"/>
                   </a:solidFill>
@@ -3017,7 +3017,7 @@
             </a:ln>
             <a:extLst>
               <a:ext uri="{91240B29-F687-4f45-9708-019B960494DF}">
-                <a14:hiddenLine xmlns="" xmlns:a14="http://schemas.microsoft.com/office/drawing/2010/main" w="9525">
+                <a14:hiddenLine xmlns:a14="http://schemas.microsoft.com/office/drawing/2010/main" xmlns="" w="9525">
                   <a:solidFill>
                     <a:srgbClr val="000000"/>
                   </a:solidFill>
@@ -3051,7 +3051,7 @@
             </a:ln>
             <a:extLst>
               <a:ext uri="{91240B29-F687-4f45-9708-019B960494DF}">
-                <a14:hiddenLine xmlns="" xmlns:a14="http://schemas.microsoft.com/office/drawing/2010/main" w="9525">
+                <a14:hiddenLine xmlns:a14="http://schemas.microsoft.com/office/drawing/2010/main" xmlns="" w="9525">
                   <a:solidFill>
                     <a:srgbClr val="000000"/>
                   </a:solidFill>
@@ -3141,7 +3141,7 @@
             </a:ln>
             <a:extLst>
               <a:ext uri="{91240B29-F687-4f45-9708-019B960494DF}">
-                <a14:hiddenLine xmlns="" xmlns:a14="http://schemas.microsoft.com/office/drawing/2010/main" w="9525">
+                <a14:hiddenLine xmlns:a14="http://schemas.microsoft.com/office/drawing/2010/main" xmlns="" w="9525">
                   <a:solidFill>
                     <a:srgbClr val="000000"/>
                   </a:solidFill>
@@ -3203,7 +3203,7 @@
             </a:ln>
             <a:extLst>
               <a:ext uri="{91240B29-F687-4f45-9708-019B960494DF}">
-                <a14:hiddenLine xmlns="" xmlns:a14="http://schemas.microsoft.com/office/drawing/2010/main" w="9525">
+                <a14:hiddenLine xmlns:a14="http://schemas.microsoft.com/office/drawing/2010/main" xmlns="" w="9525">
                   <a:solidFill>
                     <a:srgbClr val="000000"/>
                   </a:solidFill>
@@ -3265,7 +3265,7 @@
             </a:ln>
             <a:extLst>
               <a:ext uri="{91240B29-F687-4f45-9708-019B960494DF}">
-                <a14:hiddenLine xmlns="" xmlns:a14="http://schemas.microsoft.com/office/drawing/2010/main" w="9525">
+                <a14:hiddenLine xmlns:a14="http://schemas.microsoft.com/office/drawing/2010/main" xmlns="" w="9525">
                   <a:solidFill>
                     <a:srgbClr val="000000"/>
                   </a:solidFill>
@@ -3355,7 +3355,7 @@
             </a:ln>
             <a:extLst>
               <a:ext uri="{91240B29-F687-4f45-9708-019B960494DF}">
-                <a14:hiddenLine xmlns="" xmlns:a14="http://schemas.microsoft.com/office/drawing/2010/main" w="9525">
+                <a14:hiddenLine xmlns:a14="http://schemas.microsoft.com/office/drawing/2010/main" xmlns="" w="9525">
                   <a:solidFill>
                     <a:srgbClr val="000000"/>
                   </a:solidFill>
@@ -3423,7 +3423,7 @@
             </a:ln>
             <a:extLst>
               <a:ext uri="{91240B29-F687-4f45-9708-019B960494DF}">
-                <a14:hiddenLine xmlns="" xmlns:a14="http://schemas.microsoft.com/office/drawing/2010/main" w="9525">
+                <a14:hiddenLine xmlns:a14="http://schemas.microsoft.com/office/drawing/2010/main" xmlns="" w="9525">
                   <a:solidFill>
                     <a:srgbClr val="000000"/>
                   </a:solidFill>
@@ -3485,7 +3485,7 @@
             </a:ln>
             <a:extLst>
               <a:ext uri="{91240B29-F687-4f45-9708-019B960494DF}">
-                <a14:hiddenLine xmlns="" xmlns:a14="http://schemas.microsoft.com/office/drawing/2010/main" w="9525">
+                <a14:hiddenLine xmlns:a14="http://schemas.microsoft.com/office/drawing/2010/main" xmlns="" w="9525">
                   <a:solidFill>
                     <a:srgbClr val="000000"/>
                   </a:solidFill>
@@ -3575,7 +3575,7 @@
             </a:ln>
             <a:extLst>
               <a:ext uri="{91240B29-F687-4f45-9708-019B960494DF}">
-                <a14:hiddenLine xmlns="" xmlns:a14="http://schemas.microsoft.com/office/drawing/2010/main" w="9525">
+                <a14:hiddenLine xmlns:a14="http://schemas.microsoft.com/office/drawing/2010/main" xmlns="" w="9525">
                   <a:solidFill>
                     <a:srgbClr val="000000"/>
                   </a:solidFill>
@@ -3637,7 +3637,7 @@
             </a:ln>
             <a:extLst>
               <a:ext uri="{91240B29-F687-4f45-9708-019B960494DF}">
-                <a14:hiddenLine xmlns="" xmlns:a14="http://schemas.microsoft.com/office/drawing/2010/main" w="9525">
+                <a14:hiddenLine xmlns:a14="http://schemas.microsoft.com/office/drawing/2010/main" xmlns="" w="9525">
                   <a:solidFill>
                     <a:srgbClr val="000000"/>
                   </a:solidFill>
@@ -3727,7 +3727,7 @@
             </a:ln>
             <a:extLst>
               <a:ext uri="{91240B29-F687-4f45-9708-019B960494DF}">
-                <a14:hiddenLine xmlns="" xmlns:a14="http://schemas.microsoft.com/office/drawing/2010/main" w="9525">
+                <a14:hiddenLine xmlns:a14="http://schemas.microsoft.com/office/drawing/2010/main" xmlns="" w="9525">
                   <a:solidFill>
                     <a:srgbClr val="000000"/>
                   </a:solidFill>
@@ -3789,7 +3789,7 @@
             </a:ln>
             <a:extLst>
               <a:ext uri="{91240B29-F687-4f45-9708-019B960494DF}">
-                <a14:hiddenLine xmlns="" xmlns:a14="http://schemas.microsoft.com/office/drawing/2010/main" w="9525">
+                <a14:hiddenLine xmlns:a14="http://schemas.microsoft.com/office/drawing/2010/main" xmlns="" w="9525">
                   <a:solidFill>
                     <a:srgbClr val="000000"/>
                   </a:solidFill>
@@ -3879,7 +3879,7 @@
             </a:ln>
             <a:extLst>
               <a:ext uri="{91240B29-F687-4f45-9708-019B960494DF}">
-                <a14:hiddenLine xmlns="" xmlns:a14="http://schemas.microsoft.com/office/drawing/2010/main" w="9525">
+                <a14:hiddenLine xmlns:a14="http://schemas.microsoft.com/office/drawing/2010/main" xmlns="" w="9525">
                   <a:solidFill>
                     <a:srgbClr val="000000"/>
                   </a:solidFill>
@@ -3913,7 +3913,7 @@
             </a:ln>
             <a:extLst>
               <a:ext uri="{91240B29-F687-4f45-9708-019B960494DF}">
-                <a14:hiddenLine xmlns="" xmlns:a14="http://schemas.microsoft.com/office/drawing/2010/main" w="9525">
+                <a14:hiddenLine xmlns:a14="http://schemas.microsoft.com/office/drawing/2010/main" xmlns="" w="9525">
                   <a:solidFill>
                     <a:srgbClr val="000000"/>
                   </a:solidFill>
@@ -3978,7 +3978,7 @@
             </a:ln>
             <a:extLst>
               <a:ext uri="{91240B29-F687-4f45-9708-019B960494DF}">
-                <a14:hiddenLine xmlns="" xmlns:a14="http://schemas.microsoft.com/office/drawing/2010/main" w="9525">
+                <a14:hiddenLine xmlns:a14="http://schemas.microsoft.com/office/drawing/2010/main" xmlns="" w="9525">
                   <a:solidFill>
                     <a:srgbClr val="000000"/>
                   </a:solidFill>
@@ -4068,7 +4068,7 @@
             </a:ln>
             <a:extLst>
               <a:ext uri="{91240B29-F687-4f45-9708-019B960494DF}">
-                <a14:hiddenLine xmlns="" xmlns:a14="http://schemas.microsoft.com/office/drawing/2010/main" w="9525">
+                <a14:hiddenLine xmlns:a14="http://schemas.microsoft.com/office/drawing/2010/main" xmlns="" w="9525">
                   <a:solidFill>
                     <a:srgbClr val="000000"/>
                   </a:solidFill>
@@ -4130,7 +4130,7 @@
             </a:ln>
             <a:extLst>
               <a:ext uri="{91240B29-F687-4f45-9708-019B960494DF}">
-                <a14:hiddenLine xmlns="" xmlns:a14="http://schemas.microsoft.com/office/drawing/2010/main" w="9525">
+                <a14:hiddenLine xmlns:a14="http://schemas.microsoft.com/office/drawing/2010/main" xmlns="" w="9525">
                   <a:solidFill>
                     <a:srgbClr val="000000"/>
                   </a:solidFill>
@@ -4220,7 +4220,7 @@
             </a:ln>
             <a:extLst>
               <a:ext uri="{91240B29-F687-4f45-9708-019B960494DF}">
-                <a14:hiddenLine xmlns="" xmlns:a14="http://schemas.microsoft.com/office/drawing/2010/main" w="9525">
+                <a14:hiddenLine xmlns:a14="http://schemas.microsoft.com/office/drawing/2010/main" xmlns="" w="9525">
                   <a:solidFill>
                     <a:srgbClr val="000000"/>
                   </a:solidFill>
@@ -4310,7 +4310,7 @@
             </a:ln>
             <a:extLst>
               <a:ext uri="{91240B29-F687-4f45-9708-019B960494DF}">
-                <a14:hiddenLine xmlns="" xmlns:a14="http://schemas.microsoft.com/office/drawing/2010/main" w="9525">
+                <a14:hiddenLine xmlns:a14="http://schemas.microsoft.com/office/drawing/2010/main" xmlns="" w="9525">
                   <a:solidFill>
                     <a:srgbClr val="000000"/>
                   </a:solidFill>
@@ -4375,7 +4375,7 @@
             </a:ln>
             <a:extLst>
               <a:ext uri="{91240B29-F687-4f45-9708-019B960494DF}">
-                <a14:hiddenLine xmlns="" xmlns:a14="http://schemas.microsoft.com/office/drawing/2010/main" w="9525">
+                <a14:hiddenLine xmlns:a14="http://schemas.microsoft.com/office/drawing/2010/main" xmlns="" w="9525">
                   <a:solidFill>
                     <a:srgbClr val="000000"/>
                   </a:solidFill>
@@ -4437,7 +4437,7 @@
             </a:ln>
             <a:extLst>
               <a:ext uri="{91240B29-F687-4f45-9708-019B960494DF}">
-                <a14:hiddenLine xmlns="" xmlns:a14="http://schemas.microsoft.com/office/drawing/2010/main" w="9525">
+                <a14:hiddenLine xmlns:a14="http://schemas.microsoft.com/office/drawing/2010/main" xmlns="" w="9525">
                   <a:solidFill>
                     <a:srgbClr val="000000"/>
                   </a:solidFill>
@@ -4527,7 +4527,7 @@
             </a:ln>
             <a:extLst>
               <a:ext uri="{91240B29-F687-4f45-9708-019B960494DF}">
-                <a14:hiddenLine xmlns="" xmlns:a14="http://schemas.microsoft.com/office/drawing/2010/main" w="9525">
+                <a14:hiddenLine xmlns:a14="http://schemas.microsoft.com/office/drawing/2010/main" xmlns="" w="9525">
                   <a:solidFill>
                     <a:srgbClr val="000000"/>
                   </a:solidFill>
@@ -4617,7 +4617,7 @@
             </a:ln>
             <a:extLst>
               <a:ext uri="{91240B29-F687-4f45-9708-019B960494DF}">
-                <a14:hiddenLine xmlns="" xmlns:a14="http://schemas.microsoft.com/office/drawing/2010/main" w="9525">
+                <a14:hiddenLine xmlns:a14="http://schemas.microsoft.com/office/drawing/2010/main" xmlns="" w="9525">
                   <a:solidFill>
                     <a:srgbClr val="000000"/>
                   </a:solidFill>
@@ -4679,7 +4679,7 @@
             </a:ln>
             <a:extLst>
               <a:ext uri="{91240B29-F687-4f45-9708-019B960494DF}">
-                <a14:hiddenLine xmlns="" xmlns:a14="http://schemas.microsoft.com/office/drawing/2010/main" w="9525">
+                <a14:hiddenLine xmlns:a14="http://schemas.microsoft.com/office/drawing/2010/main" xmlns="" w="9525">
                   <a:solidFill>
                     <a:srgbClr val="000000"/>
                   </a:solidFill>
@@ -4799,7 +4799,7 @@
             </a:ln>
             <a:extLst>
               <a:ext uri="{91240B29-F687-4f45-9708-019B960494DF}">
-                <a14:hiddenLine xmlns="" xmlns:a14="http://schemas.microsoft.com/office/drawing/2010/main" w="9525">
+                <a14:hiddenLine xmlns:a14="http://schemas.microsoft.com/office/drawing/2010/main" xmlns="" w="9525">
                   <a:solidFill>
                     <a:srgbClr val="000000"/>
                   </a:solidFill>
@@ -4867,7 +4867,7 @@
             </a:ln>
             <a:extLst>
               <a:ext uri="{91240B29-F687-4f45-9708-019B960494DF}">
-                <a14:hiddenLine xmlns="" xmlns:a14="http://schemas.microsoft.com/office/drawing/2010/main" w="9525">
+                <a14:hiddenLine xmlns:a14="http://schemas.microsoft.com/office/drawing/2010/main" xmlns="" w="9525">
                   <a:solidFill>
                     <a:srgbClr val="000000"/>
                   </a:solidFill>
@@ -4957,7 +4957,7 @@
             </a:ln>
             <a:extLst>
               <a:ext uri="{91240B29-F687-4f45-9708-019B960494DF}">
-                <a14:hiddenLine xmlns="" xmlns:a14="http://schemas.microsoft.com/office/drawing/2010/main" w="9525">
+                <a14:hiddenLine xmlns:a14="http://schemas.microsoft.com/office/drawing/2010/main" xmlns="" w="9525">
                   <a:solidFill>
                     <a:srgbClr val="000000"/>
                   </a:solidFill>
@@ -10262,7 +10262,7 @@
           <a:noFill/>
           <a:extLst>
             <a:ext uri="{909E8E84-426E-40dd-AFC4-6F175D3DCCD1}">
-              <a14:hiddenFill xmlns="" xmlns:a14="http://schemas.microsoft.com/office/drawing/2010/main">
+              <a14:hiddenFill xmlns:a14="http://schemas.microsoft.com/office/drawing/2010/main" xmlns="">
                 <a:solidFill>
                   <a:srgbClr val="FFFFFF"/>
                 </a:solidFill>
@@ -10336,7 +10336,7 @@
               </a:ln>
               <a:extLst>
                 <a:ext uri="{91240B29-F687-4f45-9708-019B960494DF}">
-                  <a14:hiddenLine xmlns="" xmlns:a14="http://schemas.microsoft.com/office/drawing/2010/main" w="9525">
+                  <a14:hiddenLine xmlns:a14="http://schemas.microsoft.com/office/drawing/2010/main" xmlns="" w="9525">
                     <a:solidFill>
                       <a:srgbClr val="000000"/>
                     </a:solidFill>
@@ -10426,7 +10426,7 @@
               </a:ln>
               <a:extLst>
                 <a:ext uri="{91240B29-F687-4f45-9708-019B960494DF}">
-                  <a14:hiddenLine xmlns="" xmlns:a14="http://schemas.microsoft.com/office/drawing/2010/main" w="9525">
+                  <a14:hiddenLine xmlns:a14="http://schemas.microsoft.com/office/drawing/2010/main" xmlns="" w="9525">
                     <a:solidFill>
                       <a:srgbClr val="000000"/>
                     </a:solidFill>
@@ -10516,7 +10516,7 @@
               </a:ln>
               <a:extLst>
                 <a:ext uri="{91240B29-F687-4f45-9708-019B960494DF}">
-                  <a14:hiddenLine xmlns="" xmlns:a14="http://schemas.microsoft.com/office/drawing/2010/main" w="9525">
+                  <a14:hiddenLine xmlns:a14="http://schemas.microsoft.com/office/drawing/2010/main" xmlns="" w="9525">
                     <a:solidFill>
                       <a:srgbClr val="000000"/>
                     </a:solidFill>
@@ -10578,7 +10578,7 @@
               </a:ln>
               <a:extLst>
                 <a:ext uri="{91240B29-F687-4f45-9708-019B960494DF}">
-                  <a14:hiddenLine xmlns="" xmlns:a14="http://schemas.microsoft.com/office/drawing/2010/main" w="9525">
+                  <a14:hiddenLine xmlns:a14="http://schemas.microsoft.com/office/drawing/2010/main" xmlns="" w="9525">
                     <a:solidFill>
                       <a:srgbClr val="000000"/>
                     </a:solidFill>
@@ -10668,7 +10668,7 @@
               </a:ln>
               <a:extLst>
                 <a:ext uri="{91240B29-F687-4f45-9708-019B960494DF}">
-                  <a14:hiddenLine xmlns="" xmlns:a14="http://schemas.microsoft.com/office/drawing/2010/main" w="9525">
+                  <a14:hiddenLine xmlns:a14="http://schemas.microsoft.com/office/drawing/2010/main" xmlns="" w="9525">
                     <a:solidFill>
                       <a:srgbClr val="000000"/>
                     </a:solidFill>
@@ -10730,7 +10730,7 @@
               </a:ln>
               <a:extLst>
                 <a:ext uri="{91240B29-F687-4f45-9708-019B960494DF}">
-                  <a14:hiddenLine xmlns="" xmlns:a14="http://schemas.microsoft.com/office/drawing/2010/main" w="9525">
+                  <a14:hiddenLine xmlns:a14="http://schemas.microsoft.com/office/drawing/2010/main" xmlns="" w="9525">
                     <a:solidFill>
                       <a:srgbClr val="000000"/>
                     </a:solidFill>
@@ -10792,7 +10792,7 @@
               </a:ln>
               <a:extLst>
                 <a:ext uri="{91240B29-F687-4f45-9708-019B960494DF}">
-                  <a14:hiddenLine xmlns="" xmlns:a14="http://schemas.microsoft.com/office/drawing/2010/main" w="9525">
+                  <a14:hiddenLine xmlns:a14="http://schemas.microsoft.com/office/drawing/2010/main" xmlns="" w="9525">
                     <a:solidFill>
                       <a:srgbClr val="000000"/>
                     </a:solidFill>
@@ -10882,7 +10882,7 @@
               </a:ln>
               <a:extLst>
                 <a:ext uri="{91240B29-F687-4f45-9708-019B960494DF}">
-                  <a14:hiddenLine xmlns="" xmlns:a14="http://schemas.microsoft.com/office/drawing/2010/main" w="9525">
+                  <a14:hiddenLine xmlns:a14="http://schemas.microsoft.com/office/drawing/2010/main" xmlns="" w="9525">
                     <a:solidFill>
                       <a:srgbClr val="000000"/>
                     </a:solidFill>
@@ -10972,7 +10972,7 @@
               </a:ln>
               <a:extLst>
                 <a:ext uri="{91240B29-F687-4f45-9708-019B960494DF}">
-                  <a14:hiddenLine xmlns="" xmlns:a14="http://schemas.microsoft.com/office/drawing/2010/main" w="9525">
+                  <a14:hiddenLine xmlns:a14="http://schemas.microsoft.com/office/drawing/2010/main" xmlns="" w="9525">
                     <a:solidFill>
                       <a:srgbClr val="000000"/>
                     </a:solidFill>
@@ -11034,7 +11034,7 @@
               </a:ln>
               <a:extLst>
                 <a:ext uri="{91240B29-F687-4f45-9708-019B960494DF}">
-                  <a14:hiddenLine xmlns="" xmlns:a14="http://schemas.microsoft.com/office/drawing/2010/main" w="9525">
+                  <a14:hiddenLine xmlns:a14="http://schemas.microsoft.com/office/drawing/2010/main" xmlns="" w="9525">
                     <a:solidFill>
                       <a:srgbClr val="000000"/>
                     </a:solidFill>
@@ -11144,7 +11144,7 @@
               </a:ln>
               <a:extLst>
                 <a:ext uri="{91240B29-F687-4f45-9708-019B960494DF}">
-                  <a14:hiddenLine xmlns="" xmlns:a14="http://schemas.microsoft.com/office/drawing/2010/main" w="9525">
+                  <a14:hiddenLine xmlns:a14="http://schemas.microsoft.com/office/drawing/2010/main" xmlns="" w="9525">
                     <a:solidFill>
                       <a:srgbClr val="000000"/>
                     </a:solidFill>
@@ -11228,7 +11228,7 @@
               </a:ln>
               <a:extLst>
                 <a:ext uri="{91240B29-F687-4f45-9708-019B960494DF}">
-                  <a14:hiddenLine xmlns="" xmlns:a14="http://schemas.microsoft.com/office/drawing/2010/main" w="9525">
+                  <a14:hiddenLine xmlns:a14="http://schemas.microsoft.com/office/drawing/2010/main" xmlns="" w="9525">
                     <a:solidFill>
                       <a:srgbClr val="000000"/>
                     </a:solidFill>
@@ -11290,7 +11290,7 @@
               </a:ln>
               <a:extLst>
                 <a:ext uri="{91240B29-F687-4f45-9708-019B960494DF}">
-                  <a14:hiddenLine xmlns="" xmlns:a14="http://schemas.microsoft.com/office/drawing/2010/main" w="9525">
+                  <a14:hiddenLine xmlns:a14="http://schemas.microsoft.com/office/drawing/2010/main" xmlns="" w="9525">
                     <a:solidFill>
                       <a:srgbClr val="000000"/>
                     </a:solidFill>
@@ -11352,7 +11352,7 @@
               </a:ln>
               <a:extLst>
                 <a:ext uri="{91240B29-F687-4f45-9708-019B960494DF}">
-                  <a14:hiddenLine xmlns="" xmlns:a14="http://schemas.microsoft.com/office/drawing/2010/main" w="9525">
+                  <a14:hiddenLine xmlns:a14="http://schemas.microsoft.com/office/drawing/2010/main" xmlns="" w="9525">
                     <a:solidFill>
                       <a:srgbClr val="000000"/>
                     </a:solidFill>
@@ -11442,7 +11442,7 @@
               </a:ln>
               <a:extLst>
                 <a:ext uri="{91240B29-F687-4f45-9708-019B960494DF}">
-                  <a14:hiddenLine xmlns="" xmlns:a14="http://schemas.microsoft.com/office/drawing/2010/main" w="9525">
+                  <a14:hiddenLine xmlns:a14="http://schemas.microsoft.com/office/drawing/2010/main" xmlns="" w="9525">
                     <a:solidFill>
                       <a:srgbClr val="000000"/>
                     </a:solidFill>
@@ -11476,7 +11476,7 @@
               </a:ln>
               <a:extLst>
                 <a:ext uri="{91240B29-F687-4f45-9708-019B960494DF}">
-                  <a14:hiddenLine xmlns="" xmlns:a14="http://schemas.microsoft.com/office/drawing/2010/main" w="9525">
+                  <a14:hiddenLine xmlns:a14="http://schemas.microsoft.com/office/drawing/2010/main" xmlns="" w="9525">
                     <a:solidFill>
                       <a:srgbClr val="000000"/>
                     </a:solidFill>
@@ -11541,7 +11541,7 @@
               </a:ln>
               <a:extLst>
                 <a:ext uri="{91240B29-F687-4f45-9708-019B960494DF}">
-                  <a14:hiddenLine xmlns="" xmlns:a14="http://schemas.microsoft.com/office/drawing/2010/main" w="9525">
+                  <a14:hiddenLine xmlns:a14="http://schemas.microsoft.com/office/drawing/2010/main" xmlns="" w="9525">
                     <a:solidFill>
                       <a:srgbClr val="000000"/>
                     </a:solidFill>
@@ -11631,7 +11631,7 @@
               </a:ln>
               <a:extLst>
                 <a:ext uri="{91240B29-F687-4f45-9708-019B960494DF}">
-                  <a14:hiddenLine xmlns="" xmlns:a14="http://schemas.microsoft.com/office/drawing/2010/main" w="9525">
+                  <a14:hiddenLine xmlns:a14="http://schemas.microsoft.com/office/drawing/2010/main" xmlns="" w="9525">
                     <a:solidFill>
                       <a:srgbClr val="000000"/>
                     </a:solidFill>
@@ -11693,7 +11693,7 @@
               </a:ln>
               <a:extLst>
                 <a:ext uri="{91240B29-F687-4f45-9708-019B960494DF}">
-                  <a14:hiddenLine xmlns="" xmlns:a14="http://schemas.microsoft.com/office/drawing/2010/main" w="9525">
+                  <a14:hiddenLine xmlns:a14="http://schemas.microsoft.com/office/drawing/2010/main" xmlns="" w="9525">
                     <a:solidFill>
                       <a:srgbClr val="000000"/>
                     </a:solidFill>
@@ -11783,7 +11783,7 @@
               </a:ln>
               <a:extLst>
                 <a:ext uri="{91240B29-F687-4f45-9708-019B960494DF}">
-                  <a14:hiddenLine xmlns="" xmlns:a14="http://schemas.microsoft.com/office/drawing/2010/main" w="9525">
+                  <a14:hiddenLine xmlns:a14="http://schemas.microsoft.com/office/drawing/2010/main" xmlns="" w="9525">
                     <a:solidFill>
                       <a:srgbClr val="000000"/>
                     </a:solidFill>
@@ -11848,7 +11848,7 @@
               </a:ln>
               <a:extLst>
                 <a:ext uri="{91240B29-F687-4f45-9708-019B960494DF}">
-                  <a14:hiddenLine xmlns="" xmlns:a14="http://schemas.microsoft.com/office/drawing/2010/main" w="9525">
+                  <a14:hiddenLine xmlns:a14="http://schemas.microsoft.com/office/drawing/2010/main" xmlns="" w="9525">
                     <a:solidFill>
                       <a:srgbClr val="000000"/>
                     </a:solidFill>
@@ -11910,7 +11910,7 @@
               </a:ln>
               <a:extLst>
                 <a:ext uri="{91240B29-F687-4f45-9708-019B960494DF}">
-                  <a14:hiddenLine xmlns="" xmlns:a14="http://schemas.microsoft.com/office/drawing/2010/main" w="9525">
+                  <a14:hiddenLine xmlns:a14="http://schemas.microsoft.com/office/drawing/2010/main" xmlns="" w="9525">
                     <a:solidFill>
                       <a:srgbClr val="000000"/>
                     </a:solidFill>
@@ -12000,7 +12000,7 @@
               </a:ln>
               <a:extLst>
                 <a:ext uri="{91240B29-F687-4f45-9708-019B960494DF}">
-                  <a14:hiddenLine xmlns="" xmlns:a14="http://schemas.microsoft.com/office/drawing/2010/main" w="9525">
+                  <a14:hiddenLine xmlns:a14="http://schemas.microsoft.com/office/drawing/2010/main" xmlns="" w="9525">
                     <a:solidFill>
                       <a:srgbClr val="000000"/>
                     </a:solidFill>
@@ -12090,7 +12090,7 @@
               </a:ln>
               <a:extLst>
                 <a:ext uri="{91240B29-F687-4f45-9708-019B960494DF}">
-                  <a14:hiddenLine xmlns="" xmlns:a14="http://schemas.microsoft.com/office/drawing/2010/main" w="9525">
+                  <a14:hiddenLine xmlns:a14="http://schemas.microsoft.com/office/drawing/2010/main" xmlns="" w="9525">
                     <a:solidFill>
                       <a:srgbClr val="000000"/>
                     </a:solidFill>
@@ -12155,7 +12155,7 @@
               </a:ln>
               <a:extLst>
                 <a:ext uri="{91240B29-F687-4f45-9708-019B960494DF}">
-                  <a14:hiddenLine xmlns="" xmlns:a14="http://schemas.microsoft.com/office/drawing/2010/main" w="9525">
+                  <a14:hiddenLine xmlns:a14="http://schemas.microsoft.com/office/drawing/2010/main" xmlns="" w="9525">
                     <a:solidFill>
                       <a:srgbClr val="000000"/>
                     </a:solidFill>
@@ -12275,7 +12275,7 @@
               </a:ln>
               <a:extLst>
                 <a:ext uri="{91240B29-F687-4f45-9708-019B960494DF}">
-                  <a14:hiddenLine xmlns="" xmlns:a14="http://schemas.microsoft.com/office/drawing/2010/main" w="9525">
+                  <a14:hiddenLine xmlns:a14="http://schemas.microsoft.com/office/drawing/2010/main" xmlns="" w="9525">
                     <a:solidFill>
                       <a:srgbClr val="000000"/>
                     </a:solidFill>
@@ -12373,7 +12373,7 @@
               </a:ln>
               <a:extLst>
                 <a:ext uri="{91240B29-F687-4f45-9708-019B960494DF}">
-                  <a14:hiddenLine xmlns="" xmlns:a14="http://schemas.microsoft.com/office/drawing/2010/main" w="9525">
+                  <a14:hiddenLine xmlns:a14="http://schemas.microsoft.com/office/drawing/2010/main" xmlns="" w="9525">
                     <a:solidFill>
                       <a:srgbClr val="000000"/>
                     </a:solidFill>
@@ -12488,7 +12488,7 @@
               </a:ln>
               <a:extLst>
                 <a:ext uri="{91240B29-F687-4f45-9708-019B960494DF}">
-                  <a14:hiddenLine xmlns="" xmlns:a14="http://schemas.microsoft.com/office/drawing/2010/main" w="9525">
+                  <a14:hiddenLine xmlns:a14="http://schemas.microsoft.com/office/drawing/2010/main" xmlns="" w="9525">
                     <a:solidFill>
                       <a:srgbClr val="000000"/>
                     </a:solidFill>
@@ -12578,7 +12578,7 @@
               </a:ln>
               <a:extLst>
                 <a:ext uri="{91240B29-F687-4f45-9708-019B960494DF}">
-                  <a14:hiddenLine xmlns="" xmlns:a14="http://schemas.microsoft.com/office/drawing/2010/main" w="9525">
+                  <a14:hiddenLine xmlns:a14="http://schemas.microsoft.com/office/drawing/2010/main" xmlns="" w="9525">
                     <a:solidFill>
                       <a:srgbClr val="000000"/>
                     </a:solidFill>
@@ -12643,7 +12643,7 @@
               </a:ln>
               <a:extLst>
                 <a:ext uri="{91240B29-F687-4f45-9708-019B960494DF}">
-                  <a14:hiddenLine xmlns="" xmlns:a14="http://schemas.microsoft.com/office/drawing/2010/main" w="9525">
+                  <a14:hiddenLine xmlns:a14="http://schemas.microsoft.com/office/drawing/2010/main" xmlns="" w="9525">
                     <a:solidFill>
                       <a:srgbClr val="000000"/>
                     </a:solidFill>
@@ -12733,7 +12733,7 @@
               </a:ln>
               <a:extLst>
                 <a:ext uri="{91240B29-F687-4f45-9708-019B960494DF}">
-                  <a14:hiddenLine xmlns="" xmlns:a14="http://schemas.microsoft.com/office/drawing/2010/main" w="9525">
+                  <a14:hiddenLine xmlns:a14="http://schemas.microsoft.com/office/drawing/2010/main" xmlns="" w="9525">
                     <a:solidFill>
                       <a:srgbClr val="000000"/>
                     </a:solidFill>
@@ -12801,7 +12801,7 @@
               </a:ln>
               <a:extLst>
                 <a:ext uri="{91240B29-F687-4f45-9708-019B960494DF}">
-                  <a14:hiddenLine xmlns="" xmlns:a14="http://schemas.microsoft.com/office/drawing/2010/main" w="9525">
+                  <a14:hiddenLine xmlns:a14="http://schemas.microsoft.com/office/drawing/2010/main" xmlns="" w="9525">
                     <a:solidFill>
                       <a:srgbClr val="000000"/>
                     </a:solidFill>
@@ -12891,7 +12891,7 @@
               </a:ln>
               <a:extLst>
                 <a:ext uri="{91240B29-F687-4f45-9708-019B960494DF}">
-                  <a14:hiddenLine xmlns="" xmlns:a14="http://schemas.microsoft.com/office/drawing/2010/main" w="9525">
+                  <a14:hiddenLine xmlns:a14="http://schemas.microsoft.com/office/drawing/2010/main" xmlns="" w="9525">
                     <a:solidFill>
                       <a:srgbClr val="000000"/>
                     </a:solidFill>
@@ -12959,7 +12959,7 @@
               </a:ln>
               <a:extLst>
                 <a:ext uri="{91240B29-F687-4f45-9708-019B960494DF}">
-                  <a14:hiddenLine xmlns="" xmlns:a14="http://schemas.microsoft.com/office/drawing/2010/main" w="9525">
+                  <a14:hiddenLine xmlns:a14="http://schemas.microsoft.com/office/drawing/2010/main" xmlns="" w="9525">
                     <a:solidFill>
                       <a:srgbClr val="000000"/>
                     </a:solidFill>
@@ -13049,7 +13049,7 @@
               </a:ln>
               <a:extLst>
                 <a:ext uri="{91240B29-F687-4f45-9708-019B960494DF}">
-                  <a14:hiddenLine xmlns="" xmlns:a14="http://schemas.microsoft.com/office/drawing/2010/main" w="9525">
+                  <a14:hiddenLine xmlns:a14="http://schemas.microsoft.com/office/drawing/2010/main" xmlns="" w="9525">
                     <a:solidFill>
                       <a:srgbClr val="000000"/>
                     </a:solidFill>
@@ -13083,7 +13083,7 @@
               </a:ln>
               <a:extLst>
                 <a:ext uri="{91240B29-F687-4f45-9708-019B960494DF}">
-                  <a14:hiddenLine xmlns="" xmlns:a14="http://schemas.microsoft.com/office/drawing/2010/main" w="9525">
+                  <a14:hiddenLine xmlns:a14="http://schemas.microsoft.com/office/drawing/2010/main" xmlns="" w="9525">
                     <a:solidFill>
                       <a:srgbClr val="000000"/>
                     </a:solidFill>
@@ -30608,7 +30608,7 @@
             </a:pPr>
             <a:r>
               <a:rPr lang="en-US" dirty="0"/>
-              <a:t>We can add an index on the short URL column to speed up r</a:t>
+              <a:t>We can add an index on the short URL column to speed up read operations</a:t>
             </a:r>
           </a:p>
           <a:p>

</xml_diff>